<commit_message>
update Class 5 code
</commit_message>
<xml_diff>
--- a/Class Presentation/List.pptx
+++ b/Class Presentation/List.pptx
@@ -860,7 +860,7 @@
           <a:p>
             <a:fld id="{F237E058-A9B0-43FA-89CA-6BFCC1C6BCF3}" type="datetimeFigureOut">
               <a:rPr lang="en-US" smtClean="0"/>
-              <a:t>4/4/2021</a:t>
+              <a:t>6/24/23</a:t>
             </a:fld>
             <a:endParaRPr lang="en-US"/>
           </a:p>
@@ -1111,7 +1111,7 @@
           <a:p>
             <a:fld id="{F237E058-A9B0-43FA-89CA-6BFCC1C6BCF3}" type="datetimeFigureOut">
               <a:rPr lang="en-US" smtClean="0"/>
-              <a:t>4/4/2021</a:t>
+              <a:t>6/24/23</a:t>
             </a:fld>
             <a:endParaRPr lang="en-US"/>
           </a:p>
@@ -1425,7 +1425,7 @@
           <a:p>
             <a:fld id="{F237E058-A9B0-43FA-89CA-6BFCC1C6BCF3}" type="datetimeFigureOut">
               <a:rPr lang="en-US" smtClean="0"/>
-              <a:t>4/4/2021</a:t>
+              <a:t>6/24/23</a:t>
             </a:fld>
             <a:endParaRPr lang="en-US"/>
           </a:p>
@@ -1766,7 +1766,7 @@
           <a:p>
             <a:fld id="{F237E058-A9B0-43FA-89CA-6BFCC1C6BCF3}" type="datetimeFigureOut">
               <a:rPr lang="en-US" smtClean="0"/>
-              <a:t>4/4/2021</a:t>
+              <a:t>6/24/23</a:t>
             </a:fld>
             <a:endParaRPr lang="en-US"/>
           </a:p>
@@ -2080,7 +2080,7 @@
           <a:p>
             <a:fld id="{F237E058-A9B0-43FA-89CA-6BFCC1C6BCF3}" type="datetimeFigureOut">
               <a:rPr lang="en-US" smtClean="0"/>
-              <a:t>4/4/2021</a:t>
+              <a:t>6/24/23</a:t>
             </a:fld>
             <a:endParaRPr lang="en-US"/>
           </a:p>
@@ -2473,7 +2473,7 @@
           <a:p>
             <a:fld id="{F237E058-A9B0-43FA-89CA-6BFCC1C6BCF3}" type="datetimeFigureOut">
               <a:rPr lang="en-US" smtClean="0"/>
-              <a:t>4/4/2021</a:t>
+              <a:t>6/24/23</a:t>
             </a:fld>
             <a:endParaRPr lang="en-US"/>
           </a:p>
@@ -2643,7 +2643,7 @@
           <a:p>
             <a:fld id="{F237E058-A9B0-43FA-89CA-6BFCC1C6BCF3}" type="datetimeFigureOut">
               <a:rPr lang="en-US" smtClean="0"/>
-              <a:t>4/4/2021</a:t>
+              <a:t>6/24/23</a:t>
             </a:fld>
             <a:endParaRPr lang="en-US"/>
           </a:p>
@@ -2823,7 +2823,7 @@
           <a:p>
             <a:fld id="{F237E058-A9B0-43FA-89CA-6BFCC1C6BCF3}" type="datetimeFigureOut">
               <a:rPr lang="en-US" smtClean="0"/>
-              <a:t>4/4/2021</a:t>
+              <a:t>6/24/23</a:t>
             </a:fld>
             <a:endParaRPr lang="en-US"/>
           </a:p>
@@ -2999,7 +2999,7 @@
           <a:p>
             <a:fld id="{F237E058-A9B0-43FA-89CA-6BFCC1C6BCF3}" type="datetimeFigureOut">
               <a:rPr lang="en-US" smtClean="0"/>
-              <a:t>4/4/2021</a:t>
+              <a:t>6/24/23</a:t>
             </a:fld>
             <a:endParaRPr lang="en-US"/>
           </a:p>
@@ -3246,7 +3246,7 @@
           <a:p>
             <a:fld id="{F237E058-A9B0-43FA-89CA-6BFCC1C6BCF3}" type="datetimeFigureOut">
               <a:rPr lang="en-US" smtClean="0"/>
-              <a:t>4/4/2021</a:t>
+              <a:t>6/24/23</a:t>
             </a:fld>
             <a:endParaRPr lang="en-US"/>
           </a:p>
@@ -3478,7 +3478,7 @@
           <a:p>
             <a:fld id="{F237E058-A9B0-43FA-89CA-6BFCC1C6BCF3}" type="datetimeFigureOut">
               <a:rPr lang="en-US" smtClean="0"/>
-              <a:t>4/4/2021</a:t>
+              <a:t>6/24/23</a:t>
             </a:fld>
             <a:endParaRPr lang="en-US"/>
           </a:p>
@@ -3852,7 +3852,7 @@
           <a:p>
             <a:fld id="{F237E058-A9B0-43FA-89CA-6BFCC1C6BCF3}" type="datetimeFigureOut">
               <a:rPr lang="en-US" smtClean="0"/>
-              <a:t>4/4/2021</a:t>
+              <a:t>6/24/23</a:t>
             </a:fld>
             <a:endParaRPr lang="en-US"/>
           </a:p>
@@ -3975,7 +3975,7 @@
           <a:p>
             <a:fld id="{F237E058-A9B0-43FA-89CA-6BFCC1C6BCF3}" type="datetimeFigureOut">
               <a:rPr lang="en-US" smtClean="0"/>
-              <a:t>4/4/2021</a:t>
+              <a:t>6/24/23</a:t>
             </a:fld>
             <a:endParaRPr lang="en-US"/>
           </a:p>
@@ -4070,7 +4070,7 @@
           <a:p>
             <a:fld id="{F237E058-A9B0-43FA-89CA-6BFCC1C6BCF3}" type="datetimeFigureOut">
               <a:rPr lang="en-US" smtClean="0"/>
-              <a:t>4/4/2021</a:t>
+              <a:t>6/24/23</a:t>
             </a:fld>
             <a:endParaRPr lang="en-US"/>
           </a:p>
@@ -4325,7 +4325,7 @@
           <a:p>
             <a:fld id="{F237E058-A9B0-43FA-89CA-6BFCC1C6BCF3}" type="datetimeFigureOut">
               <a:rPr lang="en-US" smtClean="0"/>
-              <a:t>4/4/2021</a:t>
+              <a:t>6/24/23</a:t>
             </a:fld>
             <a:endParaRPr lang="en-US"/>
           </a:p>
@@ -4588,7 +4588,7 @@
           <a:p>
             <a:fld id="{F237E058-A9B0-43FA-89CA-6BFCC1C6BCF3}" type="datetimeFigureOut">
               <a:rPr lang="en-US" smtClean="0"/>
-              <a:t>4/4/2021</a:t>
+              <a:t>6/24/23</a:t>
             </a:fld>
             <a:endParaRPr lang="en-US"/>
           </a:p>
@@ -5331,7 +5331,7 @@
           <a:p>
             <a:fld id="{F237E058-A9B0-43FA-89CA-6BFCC1C6BCF3}" type="datetimeFigureOut">
               <a:rPr lang="en-US" smtClean="0"/>
-              <a:t>4/4/2021</a:t>
+              <a:t>6/24/23</a:t>
             </a:fld>
             <a:endParaRPr lang="en-US"/>
           </a:p>
@@ -6640,7 +6640,7 @@
                   <a:srgbClr val="002060"/>
                 </a:solidFill>
                 <a:effectLst/>
-                <a:latin typeface="georgia" panose="02040502050405020303" pitchFamily="18" charset="0"/>
+                <a:latin typeface="Georgia" panose="02040502050405020303" pitchFamily="18" charset="0"/>
               </a:rPr>
               <a:t>A map is a collection of key/value pairs. The value is retrieved from a map with its associated key. Maps are also called dictionaries. A map literal consists of a pair of curly </a:t>
             </a:r>
@@ -6650,7 +6650,7 @@
                   <a:srgbClr val="002060"/>
                 </a:solidFill>
                 <a:effectLst/>
-                <a:latin typeface="georgia" panose="02040502050405020303" pitchFamily="18" charset="0"/>
+                <a:latin typeface="Georgia" panose="02040502050405020303" pitchFamily="18" charset="0"/>
               </a:rPr>
               <a:t>brackes</a:t>
             </a:r>
@@ -6660,7 +6660,7 @@
                   <a:srgbClr val="002060"/>
                 </a:solidFill>
                 <a:effectLst/>
-                <a:latin typeface="georgia" panose="02040502050405020303" pitchFamily="18" charset="0"/>
+                <a:latin typeface="Georgia" panose="02040502050405020303" pitchFamily="18" charset="0"/>
               </a:rPr>
               <a:t>, in which we specify the key/value pairs. The pairs are separated by comma. The key is separated from the value by colon.</a:t>
             </a:r>
@@ -6670,16 +6670,16 @@
                   <a:srgbClr val="002060"/>
                 </a:solidFill>
                 <a:effectLst/>
-                <a:latin typeface="georgia" panose="02040502050405020303" pitchFamily="18" charset="0"/>
-              </a:rPr>
-            </a:br>
-            <a:br>
-              <a:rPr lang="en-US" sz="1800" b="0" i="0" dirty="0">
-                <a:solidFill>
-                  <a:srgbClr val="002060"/>
-                </a:solidFill>
-                <a:effectLst/>
-                <a:latin typeface="georgia" panose="02040502050405020303" pitchFamily="18" charset="0"/>
+                <a:latin typeface="Georgia" panose="02040502050405020303" pitchFamily="18" charset="0"/>
+              </a:rPr>
+            </a:br>
+            <a:br>
+              <a:rPr lang="en-US" sz="1800" b="0" i="0" dirty="0">
+                <a:solidFill>
+                  <a:srgbClr val="002060"/>
+                </a:solidFill>
+                <a:effectLst/>
+                <a:latin typeface="Georgia" panose="02040502050405020303" pitchFamily="18" charset="0"/>
               </a:rPr>
             </a:br>
             <a:r>
@@ -6688,7 +6688,7 @@
                   <a:srgbClr val="C00000"/>
                 </a:solidFill>
                 <a:effectLst/>
-                <a:latin typeface="georgia" panose="02040502050405020303" pitchFamily="18" charset="0"/>
+                <a:latin typeface="Georgia" panose="02040502050405020303" pitchFamily="18" charset="0"/>
               </a:rPr>
               <a:t>Example</a:t>
             </a:r>

</xml_diff>